<commit_message>
changed powerpoint and word doc
</commit_message>
<xml_diff>
--- a/crimepowerpoint.pptx
+++ b/crimepowerpoint.pptx
@@ -7,11 +7,10 @@
   <p:sldIdLst>
     <p:sldId id="263" r:id="rId2"/>
     <p:sldId id="262" r:id="rId3"/>
-    <p:sldId id="264" r:id="rId4"/>
-    <p:sldId id="265" r:id="rId5"/>
-    <p:sldId id="266" r:id="rId6"/>
-    <p:sldId id="260" r:id="rId7"/>
-    <p:sldId id="261" r:id="rId8"/>
+    <p:sldId id="265" r:id="rId4"/>
+    <p:sldId id="266" r:id="rId5"/>
+    <p:sldId id="264" r:id="rId6"/>
+    <p:sldId id="267" r:id="rId7"/>
   </p:sldIdLst>
   <p:sldSz cx="12192000" cy="6858000"/>
   <p:notesSz cx="6858000" cy="9144000"/>
@@ -111,6 +110,252 @@
     </a:lvl9pPr>
   </p:defaultTextStyle>
 </p:presentation>
+</file>
+
+<file path=ppt/revisionInfo.xml><?xml version="1.0" encoding="utf-8"?>
+<p1510:revInfo xmlns:a="http://schemas.openxmlformats.org/drawingml/2006/main" xmlns:r="http://schemas.openxmlformats.org/officeDocument/2006/relationships" xmlns:p1510="http://schemas.microsoft.com/office/powerpoint/2015/10/main">
+  <p1510:revLst>
+    <p1510:client id="{90BBD792-BDAB-4C0E-86DC-C5131E5BFD8F}" v="5" dt="2021-02-24T04:47:24.587"/>
+  </p1510:revLst>
+</p1510:revInfo>
+</file>
+
+<file path=ppt/changesInfos/changesInfo1.xml><?xml version="1.0" encoding="utf-8"?>
+<pc:chgInfo xmlns:a="http://schemas.openxmlformats.org/drawingml/2006/main" xmlns:r="http://schemas.openxmlformats.org/officeDocument/2006/relationships" xmlns:ac="http://schemas.microsoft.com/office/drawing/2013/main/command" xmlns:pc="http://schemas.microsoft.com/office/powerpoint/2013/main/command">
+  <pc:docChgLst>
+    <pc:chgData name="raymond shaine balero" userId="9fec1aeac635114e" providerId="LiveId" clId="{90BBD792-BDAB-4C0E-86DC-C5131E5BFD8F}"/>
+    <pc:docChg chg="undo custSel addSld delSld modSld sldOrd">
+      <pc:chgData name="raymond shaine balero" userId="9fec1aeac635114e" providerId="LiveId" clId="{90BBD792-BDAB-4C0E-86DC-C5131E5BFD8F}" dt="2021-02-24T05:15:33.209" v="488" actId="20577"/>
+      <pc:docMkLst>
+        <pc:docMk/>
+      </pc:docMkLst>
+      <pc:sldChg chg="del">
+        <pc:chgData name="raymond shaine balero" userId="9fec1aeac635114e" providerId="LiveId" clId="{90BBD792-BDAB-4C0E-86DC-C5131E5BFD8F}" dt="2021-02-24T04:36:29.218" v="179" actId="2696"/>
+        <pc:sldMkLst>
+          <pc:docMk/>
+          <pc:sldMk cId="1874822996" sldId="260"/>
+        </pc:sldMkLst>
+      </pc:sldChg>
+      <pc:sldChg chg="del">
+        <pc:chgData name="raymond shaine balero" userId="9fec1aeac635114e" providerId="LiveId" clId="{90BBD792-BDAB-4C0E-86DC-C5131E5BFD8F}" dt="2021-02-24T04:36:20.601" v="178" actId="2696"/>
+        <pc:sldMkLst>
+          <pc:docMk/>
+          <pc:sldMk cId="3443546882" sldId="261"/>
+        </pc:sldMkLst>
+      </pc:sldChg>
+      <pc:sldChg chg="modSp mod">
+        <pc:chgData name="raymond shaine balero" userId="9fec1aeac635114e" providerId="LiveId" clId="{90BBD792-BDAB-4C0E-86DC-C5131E5BFD8F}" dt="2021-02-24T04:37:47.125" v="181" actId="207"/>
+        <pc:sldMkLst>
+          <pc:docMk/>
+          <pc:sldMk cId="4092735971" sldId="262"/>
+        </pc:sldMkLst>
+        <pc:spChg chg="mod">
+          <ac:chgData name="raymond shaine balero" userId="9fec1aeac635114e" providerId="LiveId" clId="{90BBD792-BDAB-4C0E-86DC-C5131E5BFD8F}" dt="2021-02-24T04:37:36.910" v="180" actId="207"/>
+          <ac:spMkLst>
+            <pc:docMk/>
+            <pc:sldMk cId="4092735971" sldId="262"/>
+            <ac:spMk id="2" creationId="{30FF4F34-1CDC-499E-B9AA-13B2B28DE73D}"/>
+          </ac:spMkLst>
+        </pc:spChg>
+        <pc:spChg chg="mod">
+          <ac:chgData name="raymond shaine balero" userId="9fec1aeac635114e" providerId="LiveId" clId="{90BBD792-BDAB-4C0E-86DC-C5131E5BFD8F}" dt="2021-02-24T04:37:47.125" v="181" actId="207"/>
+          <ac:spMkLst>
+            <pc:docMk/>
+            <pc:sldMk cId="4092735971" sldId="262"/>
+            <ac:spMk id="8" creationId="{7F6BA506-AEEF-4D04-943B-4DA8062A0644}"/>
+          </ac:spMkLst>
+        </pc:spChg>
+      </pc:sldChg>
+      <pc:sldChg chg="modSp mod">
+        <pc:chgData name="raymond shaine balero" userId="9fec1aeac635114e" providerId="LiveId" clId="{90BBD792-BDAB-4C0E-86DC-C5131E5BFD8F}" dt="2021-02-24T04:56:21.510" v="362" actId="20577"/>
+        <pc:sldMkLst>
+          <pc:docMk/>
+          <pc:sldMk cId="3828500846" sldId="263"/>
+        </pc:sldMkLst>
+        <pc:spChg chg="mod">
+          <ac:chgData name="raymond shaine balero" userId="9fec1aeac635114e" providerId="LiveId" clId="{90BBD792-BDAB-4C0E-86DC-C5131E5BFD8F}" dt="2021-02-24T04:56:21.510" v="362" actId="20577"/>
+          <ac:spMkLst>
+            <pc:docMk/>
+            <pc:sldMk cId="3828500846" sldId="263"/>
+            <ac:spMk id="5" creationId="{0EA66D4F-CCD7-4F47-BD62-D6BD4C0692C6}"/>
+          </ac:spMkLst>
+        </pc:spChg>
+      </pc:sldChg>
+      <pc:sldChg chg="modSp mod ord">
+        <pc:chgData name="raymond shaine balero" userId="9fec1aeac635114e" providerId="LiveId" clId="{90BBD792-BDAB-4C0E-86DC-C5131E5BFD8F}" dt="2021-02-24T04:43:56.726" v="280"/>
+        <pc:sldMkLst>
+          <pc:docMk/>
+          <pc:sldMk cId="1148714994" sldId="264"/>
+        </pc:sldMkLst>
+        <pc:spChg chg="mod">
+          <ac:chgData name="raymond shaine balero" userId="9fec1aeac635114e" providerId="LiveId" clId="{90BBD792-BDAB-4C0E-86DC-C5131E5BFD8F}" dt="2021-02-24T04:38:15.019" v="182" actId="207"/>
+          <ac:spMkLst>
+            <pc:docMk/>
+            <pc:sldMk cId="1148714994" sldId="264"/>
+            <ac:spMk id="2" creationId="{7CDC5953-BBE0-4F7E-B580-D10F1BD4D7BC}"/>
+          </ac:spMkLst>
+        </pc:spChg>
+        <pc:spChg chg="mod">
+          <ac:chgData name="raymond shaine balero" userId="9fec1aeac635114e" providerId="LiveId" clId="{90BBD792-BDAB-4C0E-86DC-C5131E5BFD8F}" dt="2021-02-24T04:43:21.729" v="278" actId="20577"/>
+          <ac:spMkLst>
+            <pc:docMk/>
+            <pc:sldMk cId="1148714994" sldId="264"/>
+            <ac:spMk id="3" creationId="{F156CA29-7FBF-4730-8413-55DAA9C1438F}"/>
+          </ac:spMkLst>
+        </pc:spChg>
+        <pc:picChg chg="mod">
+          <ac:chgData name="raymond shaine balero" userId="9fec1aeac635114e" providerId="LiveId" clId="{90BBD792-BDAB-4C0E-86DC-C5131E5BFD8F}" dt="2021-02-24T04:40:03.675" v="202" actId="207"/>
+          <ac:picMkLst>
+            <pc:docMk/>
+            <pc:sldMk cId="1148714994" sldId="264"/>
+            <ac:picMk id="4" creationId="{993CE60F-AFFE-4979-A3EF-77069E3AAB82}"/>
+          </ac:picMkLst>
+        </pc:picChg>
+      </pc:sldChg>
+      <pc:sldChg chg="modSp mod">
+        <pc:chgData name="raymond shaine balero" userId="9fec1aeac635114e" providerId="LiveId" clId="{90BBD792-BDAB-4C0E-86DC-C5131E5BFD8F}" dt="2021-02-24T04:45:19.182" v="287" actId="20577"/>
+        <pc:sldMkLst>
+          <pc:docMk/>
+          <pc:sldMk cId="2499007630" sldId="265"/>
+        </pc:sldMkLst>
+        <pc:spChg chg="mod">
+          <ac:chgData name="raymond shaine balero" userId="9fec1aeac635114e" providerId="LiveId" clId="{90BBD792-BDAB-4C0E-86DC-C5131E5BFD8F}" dt="2021-02-24T04:38:29.574" v="186" actId="207"/>
+          <ac:spMkLst>
+            <pc:docMk/>
+            <pc:sldMk cId="2499007630" sldId="265"/>
+            <ac:spMk id="2" creationId="{E58C5A0E-8137-4F5D-88ED-71EEB5DAFE87}"/>
+          </ac:spMkLst>
+        </pc:spChg>
+        <pc:spChg chg="mod">
+          <ac:chgData name="raymond shaine balero" userId="9fec1aeac635114e" providerId="LiveId" clId="{90BBD792-BDAB-4C0E-86DC-C5131E5BFD8F}" dt="2021-02-24T04:45:19.182" v="287" actId="20577"/>
+          <ac:spMkLst>
+            <pc:docMk/>
+            <pc:sldMk cId="2499007630" sldId="265"/>
+            <ac:spMk id="7" creationId="{EFB08442-0650-477E-9370-14A7BE9E3BA1}"/>
+          </ac:spMkLst>
+        </pc:spChg>
+      </pc:sldChg>
+      <pc:sldChg chg="addSp delSp modSp mod ord">
+        <pc:chgData name="raymond shaine balero" userId="9fec1aeac635114e" providerId="LiveId" clId="{90BBD792-BDAB-4C0E-86DC-C5131E5BFD8F}" dt="2021-02-24T04:44:02.653" v="282"/>
+        <pc:sldMkLst>
+          <pc:docMk/>
+          <pc:sldMk cId="2969100067" sldId="266"/>
+        </pc:sldMkLst>
+        <pc:spChg chg="mod">
+          <ac:chgData name="raymond shaine balero" userId="9fec1aeac635114e" providerId="LiveId" clId="{90BBD792-BDAB-4C0E-86DC-C5131E5BFD8F}" dt="2021-02-24T04:38:40.184" v="188" actId="207"/>
+          <ac:spMkLst>
+            <pc:docMk/>
+            <pc:sldMk cId="2969100067" sldId="266"/>
+            <ac:spMk id="2" creationId="{6EDF4748-71E0-45D1-AE45-D45BEDE288AF}"/>
+          </ac:spMkLst>
+        </pc:spChg>
+        <pc:spChg chg="del">
+          <ac:chgData name="raymond shaine balero" userId="9fec1aeac635114e" providerId="LiveId" clId="{90BBD792-BDAB-4C0E-86DC-C5131E5BFD8F}" dt="2021-02-24T04:30:57.286" v="42"/>
+          <ac:spMkLst>
+            <pc:docMk/>
+            <pc:sldMk cId="2969100067" sldId="266"/>
+            <ac:spMk id="3" creationId="{AEADE640-FB58-4B65-AC4A-34357ABF101A}"/>
+          </ac:spMkLst>
+        </pc:spChg>
+        <pc:spChg chg="add del mod">
+          <ac:chgData name="raymond shaine balero" userId="9fec1aeac635114e" providerId="LiveId" clId="{90BBD792-BDAB-4C0E-86DC-C5131E5BFD8F}" dt="2021-02-24T04:38:46.552" v="190" actId="207"/>
+          <ac:spMkLst>
+            <pc:docMk/>
+            <pc:sldMk cId="2969100067" sldId="266"/>
+            <ac:spMk id="7" creationId="{9A091E29-E40F-42B0-8B5D-38C0B71EAD5A}"/>
+          </ac:spMkLst>
+        </pc:spChg>
+        <pc:spChg chg="mod">
+          <ac:chgData name="raymond shaine balero" userId="9fec1aeac635114e" providerId="LiveId" clId="{90BBD792-BDAB-4C0E-86DC-C5131E5BFD8F}" dt="2021-02-24T04:39:42.541" v="198" actId="14100"/>
+          <ac:spMkLst>
+            <pc:docMk/>
+            <pc:sldMk cId="2969100067" sldId="266"/>
+            <ac:spMk id="10" creationId="{4EEBB3C9-58BE-43EA-AD50-5AE380CC32DE}"/>
+          </ac:spMkLst>
+        </pc:spChg>
+        <pc:grpChg chg="add mod">
+          <ac:chgData name="raymond shaine balero" userId="9fec1aeac635114e" providerId="LiveId" clId="{90BBD792-BDAB-4C0E-86DC-C5131E5BFD8F}" dt="2021-02-24T04:39:45.205" v="199" actId="1076"/>
+          <ac:grpSpMkLst>
+            <pc:docMk/>
+            <pc:sldMk cId="2969100067" sldId="266"/>
+            <ac:grpSpMk id="9" creationId="{C83C03F0-13E2-46D6-A23B-D2FD64A8E65E}"/>
+          </ac:grpSpMkLst>
+        </pc:grpChg>
+        <pc:picChg chg="add del mod">
+          <ac:chgData name="raymond shaine balero" userId="9fec1aeac635114e" providerId="LiveId" clId="{90BBD792-BDAB-4C0E-86DC-C5131E5BFD8F}" dt="2021-02-24T04:31:16.282" v="45" actId="21"/>
+          <ac:picMkLst>
+            <pc:docMk/>
+            <pc:sldMk cId="2969100067" sldId="266"/>
+            <ac:picMk id="5" creationId="{605A4DD1-DBCC-47E8-B67F-64B060B65F49}"/>
+          </ac:picMkLst>
+        </pc:picChg>
+        <pc:picChg chg="add del mod">
+          <ac:chgData name="raymond shaine balero" userId="9fec1aeac635114e" providerId="LiveId" clId="{90BBD792-BDAB-4C0E-86DC-C5131E5BFD8F}" dt="2021-02-24T04:31:58.306" v="55"/>
+          <ac:picMkLst>
+            <pc:docMk/>
+            <pc:sldMk cId="2969100067" sldId="266"/>
+            <ac:picMk id="8" creationId="{DE035F1B-211A-45C0-BF6D-40F23DBD1227}"/>
+          </ac:picMkLst>
+        </pc:picChg>
+        <pc:picChg chg="mod">
+          <ac:chgData name="raymond shaine balero" userId="9fec1aeac635114e" providerId="LiveId" clId="{90BBD792-BDAB-4C0E-86DC-C5131E5BFD8F}" dt="2021-02-24T04:39:21.207" v="195" actId="14100"/>
+          <ac:picMkLst>
+            <pc:docMk/>
+            <pc:sldMk cId="2969100067" sldId="266"/>
+            <ac:picMk id="11" creationId="{A0E2765D-5B2B-449A-B118-2ED7C876471E}"/>
+          </ac:picMkLst>
+        </pc:picChg>
+      </pc:sldChg>
+      <pc:sldChg chg="addSp delSp modSp new mod">
+        <pc:chgData name="raymond shaine balero" userId="9fec1aeac635114e" providerId="LiveId" clId="{90BBD792-BDAB-4C0E-86DC-C5131E5BFD8F}" dt="2021-02-24T05:15:33.209" v="488" actId="20577"/>
+        <pc:sldMkLst>
+          <pc:docMk/>
+          <pc:sldMk cId="3245977186" sldId="267"/>
+        </pc:sldMkLst>
+        <pc:spChg chg="mod">
+          <ac:chgData name="raymond shaine balero" userId="9fec1aeac635114e" providerId="LiveId" clId="{90BBD792-BDAB-4C0E-86DC-C5131E5BFD8F}" dt="2021-02-24T05:11:52.856" v="468" actId="20577"/>
+          <ac:spMkLst>
+            <pc:docMk/>
+            <pc:sldMk cId="3245977186" sldId="267"/>
+            <ac:spMk id="2" creationId="{1FC81D16-CCAF-4DC4-95FC-D876E8383B8B}"/>
+          </ac:spMkLst>
+        </pc:spChg>
+        <pc:spChg chg="del">
+          <ac:chgData name="raymond shaine balero" userId="9fec1aeac635114e" providerId="LiveId" clId="{90BBD792-BDAB-4C0E-86DC-C5131E5BFD8F}" dt="2021-02-24T04:47:24.587" v="289"/>
+          <ac:spMkLst>
+            <pc:docMk/>
+            <pc:sldMk cId="3245977186" sldId="267"/>
+            <ac:spMk id="3" creationId="{1826D890-6286-4DBA-A5F7-53D7DF5831B0}"/>
+          </ac:spMkLst>
+        </pc:spChg>
+        <pc:spChg chg="add del">
+          <ac:chgData name="raymond shaine balero" userId="9fec1aeac635114e" providerId="LiveId" clId="{90BBD792-BDAB-4C0E-86DC-C5131E5BFD8F}" dt="2021-02-24T05:12:20.059" v="472" actId="11529"/>
+          <ac:spMkLst>
+            <pc:docMk/>
+            <pc:sldMk cId="3245977186" sldId="267"/>
+            <ac:spMk id="6" creationId="{6B31FA50-B4B1-4085-B87D-AA3D91095086}"/>
+          </ac:spMkLst>
+        </pc:spChg>
+        <pc:spChg chg="add mod">
+          <ac:chgData name="raymond shaine balero" userId="9fec1aeac635114e" providerId="LiveId" clId="{90BBD792-BDAB-4C0E-86DC-C5131E5BFD8F}" dt="2021-02-24T05:15:33.209" v="488" actId="20577"/>
+          <ac:spMkLst>
+            <pc:docMk/>
+            <pc:sldMk cId="3245977186" sldId="267"/>
+            <ac:spMk id="8" creationId="{AF4F382A-BA09-4A3F-A121-3F10C6776C92}"/>
+          </ac:spMkLst>
+        </pc:spChg>
+        <pc:picChg chg="add mod modCrop">
+          <ac:chgData name="raymond shaine balero" userId="9fec1aeac635114e" providerId="LiveId" clId="{90BBD792-BDAB-4C0E-86DC-C5131E5BFD8F}" dt="2021-02-24T05:14:29.354" v="484" actId="732"/>
+          <ac:picMkLst>
+            <pc:docMk/>
+            <pc:sldMk cId="3245977186" sldId="267"/>
+            <ac:picMk id="5" creationId="{7412E8DF-9A8A-4170-9344-69DB353F813F}"/>
+          </ac:picMkLst>
+        </pc:picChg>
+      </pc:sldChg>
+    </pc:docChg>
+  </pc:docChgLst>
+</pc:chgInfo>
 </file>
 
 <file path=ppt/slideLayouts/slideLayout1.xml><?xml version="1.0" encoding="utf-8"?>
@@ -3845,7 +4090,7 @@
                 <a:latin typeface="Calibri" panose="020F0502020204030204" pitchFamily="34" charset="0"/>
                 <a:ea typeface="Calibri" panose="020F0502020204030204" pitchFamily="34" charset="0"/>
               </a:rPr>
-              <a:t>Question: When a crime is committed, what would the highest rate of crime be?</a:t>
+              <a:t>Question: When a crime is committed, what would the highest rate of crimes be ? And what times did these crimes occur?</a:t>
             </a:r>
             <a:endParaRPr lang="en-US" sz="4800" dirty="0">
               <a:solidFill>
@@ -3908,7 +4153,11 @@
           <a:p>
             <a:pPr algn="ctr"/>
             <a:r>
-              <a:rPr lang="en-US" dirty="0"/>
+              <a:rPr lang="en-US" dirty="0">
+                <a:solidFill>
+                  <a:schemeClr val="bg1"/>
+                </a:solidFill>
+              </a:rPr>
               <a:t>Crime Counts</a:t>
             </a:r>
           </a:p>
@@ -3941,7 +4190,11 @@
           <a:lstStyle/>
           <a:p>
             <a:r>
-              <a:rPr lang="en-US" dirty="0"/>
+              <a:rPr lang="en-US" dirty="0">
+                <a:solidFill>
+                  <a:schemeClr val="bg1"/>
+                </a:solidFill>
+              </a:rPr>
               <a:t>3 Highest Rated Crimes: Family disturbance, Burglary of Vehicles, Theft</a:t>
             </a:r>
           </a:p>
@@ -4018,169 +4271,6 @@
           <p:cNvPr id="2" name="Title 1">
             <a:extLst>
               <a:ext uri="{FF2B5EF4-FFF2-40B4-BE49-F238E27FC236}">
-                <a16:creationId xmlns:a16="http://schemas.microsoft.com/office/drawing/2014/main" id="{7CDC5953-BBE0-4F7E-B580-D10F1BD4D7BC}"/>
-              </a:ext>
-            </a:extLst>
-          </p:cNvPr>
-          <p:cNvSpPr>
-            <a:spLocks noGrp="1"/>
-          </p:cNvSpPr>
-          <p:nvPr>
-            <p:ph type="title"/>
-          </p:nvPr>
-        </p:nvSpPr>
-        <p:spPr/>
-        <p:txBody>
-          <a:bodyPr/>
-          <a:lstStyle/>
-          <a:p>
-            <a:r>
-              <a:rPr lang="en-US" dirty="0"/>
-              <a:t>Theft – at what time did this crime occur?</a:t>
-            </a:r>
-          </a:p>
-        </p:txBody>
-      </p:sp>
-      <p:sp>
-        <p:nvSpPr>
-          <p:cNvPr id="3" name="Content Placeholder 2">
-            <a:extLst>
-              <a:ext uri="{FF2B5EF4-FFF2-40B4-BE49-F238E27FC236}">
-                <a16:creationId xmlns:a16="http://schemas.microsoft.com/office/drawing/2014/main" id="{F156CA29-7FBF-4730-8413-55DAA9C1438F}"/>
-              </a:ext>
-            </a:extLst>
-          </p:cNvPr>
-          <p:cNvSpPr>
-            <a:spLocks noGrp="1"/>
-          </p:cNvSpPr>
-          <p:nvPr>
-            <p:ph idx="1"/>
-          </p:nvPr>
-        </p:nvSpPr>
-        <p:spPr>
-          <a:xfrm>
-            <a:off x="458694" y="1949450"/>
-            <a:ext cx="5279497" cy="4195763"/>
-          </a:xfrm>
-        </p:spPr>
-        <p:txBody>
-          <a:bodyPr/>
-          <a:lstStyle/>
-          <a:p>
-            <a:r>
-              <a:rPr lang="en-US" dirty="0"/>
-              <a:t>Theft rated at 18,444 occurrences</a:t>
-            </a:r>
-          </a:p>
-          <a:p>
-            <a:r>
-              <a:rPr lang="en-US" dirty="0"/>
-              <a:t>peak time of Theft occurred    at 12PM</a:t>
-            </a:r>
-          </a:p>
-        </p:txBody>
-      </p:sp>
-      <p:pic>
-        <p:nvPicPr>
-          <p:cNvPr id="4" name="Picture 3" descr="Chart, histogram&#10;&#10;Description automatically generated">
-            <a:extLst>
-              <a:ext uri="{FF2B5EF4-FFF2-40B4-BE49-F238E27FC236}">
-                <a16:creationId xmlns:a16="http://schemas.microsoft.com/office/drawing/2014/main" id="{993CE60F-AFFE-4979-A3EF-77069E3AAB82}"/>
-              </a:ext>
-            </a:extLst>
-          </p:cNvPr>
-          <p:cNvPicPr>
-            <a:picLocks noChangeAspect="1"/>
-          </p:cNvPicPr>
-          <p:nvPr/>
-        </p:nvPicPr>
-        <p:blipFill>
-          <a:blip r:embed="rId2">
-            <a:extLst>
-              <a:ext uri="{28A0092B-C50C-407E-A947-70E740481C1C}">
-                <a14:useLocalDpi xmlns:a14="http://schemas.microsoft.com/office/drawing/2010/main" val="0"/>
-              </a:ext>
-            </a:extLst>
-          </a:blip>
-          <a:stretch>
-            <a:fillRect/>
-          </a:stretch>
-        </p:blipFill>
-        <p:spPr>
-          <a:xfrm>
-            <a:off x="6247592" y="2218759"/>
-            <a:ext cx="5485714" cy="3657143"/>
-          </a:xfrm>
-          <a:prstGeom prst="rect">
-            <a:avLst/>
-          </a:prstGeom>
-          <a:solidFill>
-            <a:srgbClr val="FFFFFF">
-              <a:shade val="85000"/>
-            </a:srgbClr>
-          </a:solidFill>
-          <a:ln w="88900" cap="sq">
-            <a:solidFill>
-              <a:srgbClr val="FFFFFF"/>
-            </a:solidFill>
-            <a:miter lim="800000"/>
-          </a:ln>
-          <a:effectLst>
-            <a:outerShdw blurRad="55000" dist="18000" dir="5400000" algn="tl" rotWithShape="0">
-              <a:srgbClr val="000000">
-                <a:alpha val="40000"/>
-              </a:srgbClr>
-            </a:outerShdw>
-          </a:effectLst>
-          <a:scene3d>
-            <a:camera prst="orthographicFront"/>
-            <a:lightRig rig="twoPt" dir="t">
-              <a:rot lat="0" lon="0" rev="7200000"/>
-            </a:lightRig>
-          </a:scene3d>
-          <a:sp3d>
-            <a:bevelT w="25400" h="19050"/>
-            <a:contourClr>
-              <a:srgbClr val="FFFFFF"/>
-            </a:contourClr>
-          </a:sp3d>
-        </p:spPr>
-      </p:pic>
-    </p:spTree>
-    <p:extLst>
-      <p:ext uri="{BB962C8B-B14F-4D97-AF65-F5344CB8AC3E}">
-        <p14:creationId xmlns:p14="http://schemas.microsoft.com/office/powerpoint/2010/main" val="1148714994"/>
-      </p:ext>
-    </p:extLst>
-  </p:cSld>
-  <p:clrMapOvr>
-    <a:masterClrMapping/>
-  </p:clrMapOvr>
-</p:sld>
-</file>
-
-<file path=ppt/slides/slide4.xml><?xml version="1.0" encoding="utf-8"?>
-<p:sld xmlns:a="http://schemas.openxmlformats.org/drawingml/2006/main" xmlns:r="http://schemas.openxmlformats.org/officeDocument/2006/relationships" xmlns:p="http://schemas.openxmlformats.org/presentationml/2006/main">
-  <p:cSld>
-    <p:spTree>
-      <p:nvGrpSpPr>
-        <p:cNvPr id="1" name=""/>
-        <p:cNvGrpSpPr/>
-        <p:nvPr/>
-      </p:nvGrpSpPr>
-      <p:grpSpPr>
-        <a:xfrm>
-          <a:off x="0" y="0"/>
-          <a:ext cx="0" cy="0"/>
-          <a:chOff x="0" y="0"/>
-          <a:chExt cx="0" cy="0"/>
-        </a:xfrm>
-      </p:grpSpPr>
-      <p:sp>
-        <p:nvSpPr>
-          <p:cNvPr id="2" name="Title 1">
-            <a:extLst>
-              <a:ext uri="{FF2B5EF4-FFF2-40B4-BE49-F238E27FC236}">
                 <a16:creationId xmlns:a16="http://schemas.microsoft.com/office/drawing/2014/main" id="{E58C5A0E-8137-4F5D-88ED-71EEB5DAFE87}"/>
               </a:ext>
             </a:extLst>
@@ -4200,7 +4290,11 @@
           <a:lstStyle/>
           <a:p>
             <a:r>
-              <a:rPr lang="en-US" sz="3600" dirty="0"/>
+              <a:rPr lang="en-US" sz="3600" dirty="0">
+                <a:solidFill>
+                  <a:schemeClr val="bg1"/>
+                </a:solidFill>
+              </a:rPr>
               <a:t>Family Disturbances – what time did this occur?</a:t>
             </a:r>
           </a:p>
@@ -4339,20 +4433,32 @@
           <a:lstStyle/>
           <a:p>
             <a:r>
-              <a:rPr lang="en-US" dirty="0"/>
-              <a:t>Family Disturbances rated at 25,278</a:t>
-            </a:r>
-          </a:p>
-          <a:p>
-            <a:r>
-              <a:rPr lang="en-US" dirty="0"/>
+              <a:rPr lang="en-US" dirty="0">
+                <a:solidFill>
+                  <a:schemeClr val="bg1"/>
+                </a:solidFill>
+              </a:rPr>
+              <a:t>Family Disturbances rated at 25,278 </a:t>
+            </a:r>
+          </a:p>
+          <a:p>
+            <a:r>
+              <a:rPr lang="en-US" dirty="0">
+                <a:solidFill>
+                  <a:schemeClr val="bg1"/>
+                </a:solidFill>
+              </a:rPr>
               <a:t>Crime occurrences gradually increased from 12PM – 12AM</a:t>
             </a:r>
           </a:p>
           <a:p>
             <a:r>
-              <a:rPr lang="en-US" dirty="0"/>
-              <a:t>Peak occurrence around 12AM</a:t>
+              <a:rPr lang="en-US" dirty="0">
+                <a:solidFill>
+                  <a:schemeClr val="bg1"/>
+                </a:solidFill>
+              </a:rPr>
+              <a:t>Peak occurrence is  around 12AM</a:t>
             </a:r>
           </a:p>
         </p:txBody>
@@ -4370,7 +4476,7 @@
 </p:sld>
 </file>
 
-<file path=ppt/slides/slide5.xml><?xml version="1.0" encoding="utf-8"?>
+<file path=ppt/slides/slide4.xml><?xml version="1.0" encoding="utf-8"?>
 <p:sld xmlns:a="http://schemas.openxmlformats.org/drawingml/2006/main" xmlns:r="http://schemas.openxmlformats.org/officeDocument/2006/relationships" xmlns:p="http://schemas.openxmlformats.org/presentationml/2006/main">
   <p:cSld>
     <p:spTree>
@@ -4405,548 +4511,65 @@
         </p:nvSpPr>
         <p:spPr/>
         <p:txBody>
-          <a:bodyPr/>
-          <a:lstStyle/>
-          <a:p>
-            <a:r>
-              <a:rPr lang="en-US" dirty="0"/>
-              <a:t>Burglary of  Vehicle: </a:t>
-            </a:r>
-          </a:p>
-        </p:txBody>
-      </p:sp>
-      <p:sp>
-        <p:nvSpPr>
-          <p:cNvPr id="3" name="Content Placeholder 2">
-            <a:extLst>
-              <a:ext uri="{FF2B5EF4-FFF2-40B4-BE49-F238E27FC236}">
-                <a16:creationId xmlns:a16="http://schemas.microsoft.com/office/drawing/2014/main" id="{AEADE640-FB58-4B65-AC4A-34357ABF101A}"/>
-              </a:ext>
-            </a:extLst>
-          </p:cNvPr>
-          <p:cNvSpPr>
-            <a:spLocks noGrp="1"/>
-          </p:cNvSpPr>
-          <p:nvPr>
-            <p:ph idx="1"/>
-          </p:nvPr>
-        </p:nvSpPr>
-        <p:spPr/>
-        <p:txBody>
-          <a:bodyPr/>
-          <a:lstStyle/>
-          <a:p>
-            <a:endParaRPr lang="en-US"/>
-          </a:p>
-        </p:txBody>
-      </p:sp>
-    </p:spTree>
-    <p:extLst>
-      <p:ext uri="{BB962C8B-B14F-4D97-AF65-F5344CB8AC3E}">
-        <p14:creationId xmlns:p14="http://schemas.microsoft.com/office/powerpoint/2010/main" val="2969100067"/>
-      </p:ext>
-    </p:extLst>
-  </p:cSld>
-  <p:clrMapOvr>
-    <a:masterClrMapping/>
-  </p:clrMapOvr>
-</p:sld>
-</file>
-
-<file path=ppt/slides/slide6.xml><?xml version="1.0" encoding="utf-8"?>
-<p:sld xmlns:a="http://schemas.openxmlformats.org/drawingml/2006/main" xmlns:r="http://schemas.openxmlformats.org/officeDocument/2006/relationships" xmlns:p="http://schemas.openxmlformats.org/presentationml/2006/main">
-  <p:cSld>
-    <p:bg>
-      <p:bgPr>
-        <a:solidFill>
-          <a:schemeClr val="bg1"/>
-        </a:solidFill>
-        <a:effectLst/>
-      </p:bgPr>
-    </p:bg>
-    <p:spTree>
-      <p:nvGrpSpPr>
-        <p:cNvPr id="1" name=""/>
-        <p:cNvGrpSpPr/>
-        <p:nvPr/>
-      </p:nvGrpSpPr>
-      <p:grpSpPr>
-        <a:xfrm>
-          <a:off x="0" y="0"/>
-          <a:ext cx="0" cy="0"/>
-          <a:chOff x="0" y="0"/>
-          <a:chExt cx="0" cy="0"/>
-        </a:xfrm>
-      </p:grpSpPr>
-      <p:sp useBgFill="1">
-        <p:nvSpPr>
-          <p:cNvPr id="9" name="Rectangle 8">
-            <a:extLst>
-              <a:ext uri="{FF2B5EF4-FFF2-40B4-BE49-F238E27FC236}">
-                <a16:creationId xmlns:a16="http://schemas.microsoft.com/office/drawing/2014/main" id="{1E644DE9-8D09-43E2-BA69-F57482CFC93A}"/>
-              </a:ext>
-              <a:ext uri="{C183D7F6-B498-43B3-948B-1728B52AA6E4}">
-                <adec:decorative xmlns:adec="http://schemas.microsoft.com/office/drawing/2017/decorative" val="1"/>
-              </a:ext>
-            </a:extLst>
-          </p:cNvPr>
-          <p:cNvSpPr>
-            <a:spLocks noGrp="1" noRot="1" noChangeAspect="1" noMove="1" noResize="1" noEditPoints="1" noAdjustHandles="1" noChangeArrowheads="1" noChangeShapeType="1" noTextEdit="1"/>
-          </p:cNvSpPr>
-          <p:nvPr>
-            <p:extLst>
-              <p:ext uri="{386F3935-93C4-4BCD-93E2-E3B085C9AB24}">
-                <p16:designElem xmlns:p16="http://schemas.microsoft.com/office/powerpoint/2015/main" val="1"/>
-              </p:ext>
-            </p:extLst>
-          </p:nvPr>
-        </p:nvSpPr>
-        <p:spPr>
-          <a:xfrm>
-            <a:off x="0" y="0"/>
-            <a:ext cx="12188952" cy="6858000"/>
-          </a:xfrm>
-          <a:prstGeom prst="rect">
-            <a:avLst/>
-          </a:prstGeom>
-          <a:ln>
-            <a:noFill/>
-          </a:ln>
-        </p:spPr>
-        <p:style>
-          <a:lnRef idx="2">
-            <a:schemeClr val="accent1">
-              <a:shade val="50000"/>
-            </a:schemeClr>
-          </a:lnRef>
-          <a:fillRef idx="1">
-            <a:schemeClr val="accent1"/>
-          </a:fillRef>
-          <a:effectRef idx="0">
-            <a:schemeClr val="accent1"/>
-          </a:effectRef>
-          <a:fontRef idx="minor">
-            <a:schemeClr val="lt1"/>
-          </a:fontRef>
-        </p:style>
-        <p:txBody>
-          <a:bodyPr rtlCol="0" anchor="ctr"/>
-          <a:lstStyle/>
-          <a:p>
-            <a:pPr algn="ctr"/>
-            <a:endParaRPr lang="en-US" dirty="0">
-              <a:solidFill>
-                <a:schemeClr val="tx1">
-                  <a:lumMod val="65000"/>
-                  <a:lumOff val="35000"/>
-                </a:schemeClr>
-              </a:solidFill>
-              <a:latin typeface="AvenirNext LT Pro Medium" panose="020B0504020202020204" pitchFamily="34" charset="0"/>
-            </a:endParaRPr>
-          </a:p>
-        </p:txBody>
-      </p:sp>
-      <p:sp>
-        <p:nvSpPr>
-          <p:cNvPr id="11" name="Rectangle 10">
-            <a:extLst>
-              <a:ext uri="{FF2B5EF4-FFF2-40B4-BE49-F238E27FC236}">
-                <a16:creationId xmlns:a16="http://schemas.microsoft.com/office/drawing/2014/main" id="{6C23C919-B32E-40FF-B3D8-631316E84E3E}"/>
-              </a:ext>
-              <a:ext uri="{C183D7F6-B498-43B3-948B-1728B52AA6E4}">
-                <adec:decorative xmlns:adec="http://schemas.microsoft.com/office/drawing/2017/decorative" val="1"/>
-              </a:ext>
-            </a:extLst>
-          </p:cNvPr>
-          <p:cNvSpPr>
-            <a:spLocks noGrp="1" noRot="1" noChangeAspect="1" noMove="1" noResize="1" noEditPoints="1" noAdjustHandles="1" noChangeArrowheads="1" noChangeShapeType="1" noTextEdit="1"/>
-          </p:cNvSpPr>
-          <p:nvPr>
-            <p:extLst>
-              <p:ext uri="{386F3935-93C4-4BCD-93E2-E3B085C9AB24}">
-                <p16:designElem xmlns:p16="http://schemas.microsoft.com/office/powerpoint/2015/main" val="1"/>
-              </p:ext>
-            </p:extLst>
-          </p:nvPr>
-        </p:nvSpPr>
-        <p:spPr>
-          <a:xfrm>
-            <a:off x="0" y="0"/>
-            <a:ext cx="12192000" cy="6858000"/>
-          </a:xfrm>
-          <a:prstGeom prst="rect">
-            <a:avLst/>
-          </a:prstGeom>
-          <a:solidFill>
-            <a:srgbClr val="000000"/>
-          </a:solidFill>
-          <a:ln>
-            <a:noFill/>
-          </a:ln>
-        </p:spPr>
-        <p:style>
-          <a:lnRef idx="2">
-            <a:schemeClr val="accent1">
-              <a:shade val="50000"/>
-            </a:schemeClr>
-          </a:lnRef>
-          <a:fillRef idx="1">
-            <a:schemeClr val="accent1"/>
-          </a:fillRef>
-          <a:effectRef idx="0">
-            <a:schemeClr val="accent1"/>
-          </a:effectRef>
-          <a:fontRef idx="minor">
-            <a:schemeClr val="lt1"/>
-          </a:fontRef>
-        </p:style>
-        <p:txBody>
-          <a:bodyPr rtlCol="0" anchor="ctr"/>
-          <a:lstStyle/>
-          <a:p>
-            <a:pPr algn="ctr"/>
-            <a:endParaRPr lang="en-US" dirty="0">
-              <a:solidFill>
-                <a:schemeClr val="tx1">
-                  <a:lumMod val="65000"/>
-                  <a:lumOff val="35000"/>
-                </a:schemeClr>
-              </a:solidFill>
-              <a:latin typeface="AvenirNext LT Pro Medium" panose="020B0504020202020204" pitchFamily="34" charset="0"/>
-            </a:endParaRPr>
-          </a:p>
-        </p:txBody>
-      </p:sp>
-      <p:pic>
-        <p:nvPicPr>
-          <p:cNvPr id="4" name="Picture 3" descr="Technological background">
-            <a:extLst>
-              <a:ext uri="{FF2B5EF4-FFF2-40B4-BE49-F238E27FC236}">
-                <a16:creationId xmlns:a16="http://schemas.microsoft.com/office/drawing/2014/main" id="{C8F5ED7E-4C1E-41FD-8DF0-B840671492D7}"/>
-              </a:ext>
-            </a:extLst>
-          </p:cNvPr>
-          <p:cNvPicPr>
-            <a:picLocks noChangeAspect="1"/>
-          </p:cNvPicPr>
-          <p:nvPr/>
-        </p:nvPicPr>
-        <p:blipFill rotWithShape="1">
-          <a:blip r:embed="rId2">
-            <a:alphaModFix amt="60000"/>
-          </a:blip>
-          <a:srcRect t="5122" b="10626"/>
-          <a:stretch/>
-        </p:blipFill>
-        <p:spPr>
-          <a:xfrm>
-            <a:off x="-73554" y="-2"/>
-            <a:ext cx="12191980" cy="6856614"/>
-          </a:xfrm>
-          <a:prstGeom prst="rect">
-            <a:avLst/>
-          </a:prstGeom>
-        </p:spPr>
-      </p:pic>
-      <p:grpSp>
-        <p:nvGrpSpPr>
-          <p:cNvPr id="13" name="Group 12">
-            <a:extLst>
-              <a:ext uri="{FF2B5EF4-FFF2-40B4-BE49-F238E27FC236}">
-                <a16:creationId xmlns:a16="http://schemas.microsoft.com/office/drawing/2014/main" id="{5EDAD761-2CF4-463A-AD87-1D4E8549D7A5}"/>
-              </a:ext>
-              <a:ext uri="{C183D7F6-B498-43B3-948B-1728B52AA6E4}">
-                <adec:decorative xmlns:adec="http://schemas.microsoft.com/office/drawing/2017/decorative" val="1"/>
-              </a:ext>
-            </a:extLst>
-          </p:cNvPr>
-          <p:cNvGrpSpPr>
-            <a:grpSpLocks noGrp="1" noUngrp="1" noRot="1" noChangeAspect="1" noMove="1" noResize="1"/>
-          </p:cNvGrpSpPr>
-          <p:nvPr>
-            <p:extLst>
-              <p:ext uri="{386F3935-93C4-4BCD-93E2-E3B085C9AB24}">
-                <p16:designElem xmlns:p16="http://schemas.microsoft.com/office/powerpoint/2015/main" val="1"/>
-              </p:ext>
-            </p:extLst>
-          </p:nvPr>
-        </p:nvGrpSpPr>
-        <p:grpSpPr>
-          <a:xfrm>
-            <a:off x="4464881" y="0"/>
-            <a:ext cx="7724071" cy="6858000"/>
-            <a:chOff x="4464881" y="0"/>
-            <a:chExt cx="7724071" cy="6858000"/>
-          </a:xfrm>
-        </p:grpSpPr>
-        <p:pic>
-          <p:nvPicPr>
-            <p:cNvPr id="14" name="Picture 13">
-              <a:extLst>
-                <a:ext uri="{FF2B5EF4-FFF2-40B4-BE49-F238E27FC236}">
-                  <a16:creationId xmlns:a16="http://schemas.microsoft.com/office/drawing/2014/main" id="{D9DF7D3C-2892-4632-9E66-4D1E023A00E6}"/>
-                </a:ext>
-                <a:ext uri="{C183D7F6-B498-43B3-948B-1728B52AA6E4}">
-                  <adec:decorative xmlns:adec="http://schemas.microsoft.com/office/drawing/2017/decorative" val="1"/>
-                </a:ext>
-              </a:extLst>
-            </p:cNvPr>
-            <p:cNvPicPr>
-              <a:picLocks noChangeAspect="1"/>
-            </p:cNvPicPr>
-            <p:nvPr>
-              <p:extLst>
-                <p:ext uri="{386F3935-93C4-4BCD-93E2-E3B085C9AB24}">
-                  <p16:designElem xmlns:p16="http://schemas.microsoft.com/office/powerpoint/2015/main" val="1"/>
-                </p:ext>
-              </p:extLst>
-            </p:nvPr>
-          </p:nvPicPr>
-          <p:blipFill>
-            <a:blip r:embed="rId3">
-              <a:alphaModFix amt="25000"/>
-              <a:extLst>
-                <a:ext uri="{28A0092B-C50C-407E-A947-70E740481C1C}">
-                  <a14:useLocalDpi xmlns:a14="http://schemas.microsoft.com/office/drawing/2010/main" val="0"/>
-                </a:ext>
-              </a:extLst>
-            </a:blip>
-            <a:stretch>
-              <a:fillRect/>
-            </a:stretch>
-          </p:blipFill>
-          <p:spPr>
-            <a:xfrm>
-              <a:off x="7073255" y="0"/>
-              <a:ext cx="5115697" cy="6858000"/>
-            </a:xfrm>
-            <a:prstGeom prst="rect">
-              <a:avLst/>
-            </a:prstGeom>
-          </p:spPr>
-        </p:pic>
-        <p:pic>
-          <p:nvPicPr>
-            <p:cNvPr id="15" name="Picture 14">
-              <a:extLst>
-                <a:ext uri="{FF2B5EF4-FFF2-40B4-BE49-F238E27FC236}">
-                  <a16:creationId xmlns:a16="http://schemas.microsoft.com/office/drawing/2014/main" id="{3D2FAD08-001D-4400-AF80-51C864EF74FF}"/>
-                </a:ext>
-                <a:ext uri="{C183D7F6-B498-43B3-948B-1728B52AA6E4}">
-                  <adec:decorative xmlns:adec="http://schemas.microsoft.com/office/drawing/2017/decorative" val="1"/>
-                </a:ext>
-              </a:extLst>
-            </p:cNvPr>
-            <p:cNvPicPr>
-              <a:picLocks noChangeAspect="1"/>
-            </p:cNvPicPr>
-            <p:nvPr>
-              <p:extLst>
-                <p:ext uri="{386F3935-93C4-4BCD-93E2-E3B085C9AB24}">
-                  <p16:designElem xmlns:p16="http://schemas.microsoft.com/office/powerpoint/2015/main" val="1"/>
-                </p:ext>
-              </p:extLst>
-            </p:nvPr>
-          </p:nvPicPr>
-          <p:blipFill>
-            <a:blip r:embed="rId4">
-              <a:alphaModFix amt="15000"/>
-              <a:extLst>
-                <a:ext uri="{28A0092B-C50C-407E-A947-70E740481C1C}">
-                  <a14:useLocalDpi xmlns:a14="http://schemas.microsoft.com/office/drawing/2010/main" val="0"/>
-                </a:ext>
-              </a:extLst>
-            </a:blip>
-            <a:stretch>
-              <a:fillRect/>
-            </a:stretch>
-          </p:blipFill>
-          <p:spPr>
-            <a:xfrm rot="16200000">
-              <a:off x="5412135" y="-947254"/>
-              <a:ext cx="5562598" cy="7457106"/>
-            </a:xfrm>
-            <a:prstGeom prst="rect">
-              <a:avLst/>
-            </a:prstGeom>
-            <a:effectLst>
-              <a:softEdge rad="0"/>
-            </a:effectLst>
-          </p:spPr>
-        </p:pic>
-      </p:grpSp>
-      <p:sp>
-        <p:nvSpPr>
-          <p:cNvPr id="3" name="Subtitle 2">
-            <a:extLst>
-              <a:ext uri="{FF2B5EF4-FFF2-40B4-BE49-F238E27FC236}">
-                <a16:creationId xmlns:a16="http://schemas.microsoft.com/office/drawing/2014/main" id="{76E4A2C6-156D-41C8-BC1B-D9AB35E169AA}"/>
-              </a:ext>
-            </a:extLst>
-          </p:cNvPr>
-          <p:cNvSpPr>
-            <a:spLocks noGrp="1"/>
-          </p:cNvSpPr>
-          <p:nvPr>
-            <p:ph type="subTitle" idx="1"/>
-          </p:nvPr>
-        </p:nvSpPr>
-        <p:spPr>
-          <a:xfrm>
-            <a:off x="838200" y="4074515"/>
-            <a:ext cx="7583133" cy="1279124"/>
-          </a:xfrm>
-        </p:spPr>
-        <p:txBody>
-          <a:bodyPr>
-            <a:normAutofit lnSpcReduction="10000"/>
-          </a:bodyPr>
-          <a:lstStyle/>
-          <a:p>
-            <a:pPr marL="0" marR="0">
-              <a:lnSpc>
-                <a:spcPct val="107000"/>
-              </a:lnSpc>
-              <a:spcBef>
-                <a:spcPts val="0"/>
-              </a:spcBef>
-              <a:spcAft>
-                <a:spcPts val="800"/>
-              </a:spcAft>
-            </a:pPr>
-            <a:r>
-              <a:rPr lang="en-US" sz="7200" dirty="0">
-                <a:solidFill>
-                  <a:schemeClr val="bg1">
-                    <a:lumMod val="95000"/>
-                  </a:schemeClr>
-                </a:solidFill>
-              </a:rPr>
-              <a:t>      </a:t>
-            </a:r>
-            <a:endParaRPr lang="en-US" sz="7200" dirty="0">
-              <a:solidFill>
-                <a:schemeClr val="bg2">
-                  <a:lumMod val="90000"/>
-                </a:schemeClr>
-              </a:solidFill>
-              <a:effectLst/>
-              <a:latin typeface="Calibri" panose="020F0502020204030204" pitchFamily="34" charset="0"/>
-              <a:ea typeface="Calibri" panose="020F0502020204030204" pitchFamily="34" charset="0"/>
-              <a:cs typeface="Times New Roman" panose="02020603050405020304" pitchFamily="18" charset="0"/>
-            </a:endParaRPr>
-          </a:p>
-          <a:p>
-            <a:pPr marL="342900" indent="-342900" algn="l">
-              <a:buFont typeface="Arial" panose="020B0604020202020204" pitchFamily="34" charset="0"/>
-              <a:buChar char="•"/>
-            </a:pPr>
-            <a:endParaRPr lang="en-US" sz="3600" dirty="0">
-              <a:solidFill>
-                <a:schemeClr val="bg1">
-                  <a:lumMod val="95000"/>
-                </a:schemeClr>
-              </a:solidFill>
-            </a:endParaRPr>
-          </a:p>
-        </p:txBody>
-      </p:sp>
-      <p:sp>
-        <p:nvSpPr>
-          <p:cNvPr id="6" name="Title 5">
-            <a:extLst>
-              <a:ext uri="{FF2B5EF4-FFF2-40B4-BE49-F238E27FC236}">
-                <a16:creationId xmlns:a16="http://schemas.microsoft.com/office/drawing/2014/main" id="{FBAFD73F-0268-467A-B300-A7448F44D6D0}"/>
-              </a:ext>
-            </a:extLst>
-          </p:cNvPr>
-          <p:cNvSpPr>
-            <a:spLocks noGrp="1"/>
-          </p:cNvSpPr>
-          <p:nvPr>
-            <p:ph type="ctrTitle"/>
-          </p:nvPr>
-        </p:nvSpPr>
-        <p:spPr/>
-        <p:txBody>
           <a:bodyPr>
             <a:normAutofit fontScale="90000"/>
           </a:bodyPr>
           <a:lstStyle/>
           <a:p>
-            <a:pPr marL="0" marR="0">
-              <a:lnSpc>
-                <a:spcPct val="107000"/>
-              </a:lnSpc>
-              <a:spcBef>
-                <a:spcPts val="0"/>
-              </a:spcBef>
-              <a:spcAft>
-                <a:spcPts val="800"/>
-              </a:spcAft>
-            </a:pPr>
-            <a:r>
-              <a:rPr lang="en-US" sz="4000" b="1" dirty="0">
+            <a:r>
+              <a:rPr lang="en-US" dirty="0">
                 <a:solidFill>
                   <a:schemeClr val="bg1"/>
                 </a:solidFill>
-                <a:effectLst/>
-                <a:latin typeface="Calibri" panose="020F0502020204030204" pitchFamily="34" charset="0"/>
-                <a:ea typeface="Calibri" panose="020F0502020204030204" pitchFamily="34" charset="0"/>
-                <a:cs typeface="Calibri" panose="020F0502020204030204" pitchFamily="34" charset="0"/>
               </a:rPr>
-              <a:t>Second highest crime that rated next was burglary of vehicle rated 23,572</a:t>
-            </a:r>
-            <a:r>
-              <a:rPr lang="en-US" sz="4000" b="1" dirty="0">
-                <a:effectLst/>
-                <a:latin typeface="Calibri" panose="020F0502020204030204" pitchFamily="34" charset="0"/>
-                <a:ea typeface="Calibri" panose="020F0502020204030204" pitchFamily="34" charset="0"/>
-                <a:cs typeface="Calibri" panose="020F0502020204030204" pitchFamily="34" charset="0"/>
+              <a:t>Burglary of  Vehicle: rated at 23,572 in occurrences as a second highest crime</a:t>
+            </a:r>
+          </a:p>
+        </p:txBody>
+      </p:sp>
+      <p:sp>
+        <p:nvSpPr>
+          <p:cNvPr id="7" name="Content Placeholder 6">
+            <a:extLst>
+              <a:ext uri="{FF2B5EF4-FFF2-40B4-BE49-F238E27FC236}">
+                <a16:creationId xmlns:a16="http://schemas.microsoft.com/office/drawing/2014/main" id="{9A091E29-E40F-42B0-8B5D-38C0B71EAD5A}"/>
+              </a:ext>
+            </a:extLst>
+          </p:cNvPr>
+          <p:cNvSpPr>
+            <a:spLocks noGrp="1"/>
+          </p:cNvSpPr>
+          <p:nvPr>
+            <p:ph idx="1"/>
+          </p:nvPr>
+        </p:nvSpPr>
+        <p:spPr>
+          <a:xfrm>
+            <a:off x="458694" y="1949450"/>
+            <a:ext cx="5447596" cy="4195763"/>
+          </a:xfrm>
+        </p:spPr>
+        <p:txBody>
+          <a:bodyPr/>
+          <a:lstStyle/>
+          <a:p>
+            <a:r>
+              <a:rPr lang="en-US" dirty="0">
+                <a:solidFill>
+                  <a:schemeClr val="bg1"/>
+                </a:solidFill>
               </a:rPr>
-              <a:t>.</a:t>
-            </a:r>
-            <a:br>
-              <a:rPr lang="en-US" sz="1800" dirty="0">
-                <a:effectLst/>
-                <a:latin typeface="Calibri" panose="020F0502020204030204" pitchFamily="34" charset="0"/>
-                <a:ea typeface="Calibri" panose="020F0502020204030204" pitchFamily="34" charset="0"/>
-                <a:cs typeface="Times New Roman" panose="02020603050405020304" pitchFamily="18" charset="0"/>
-              </a:rPr>
-            </a:br>
-            <a:r>
-              <a:rPr lang="en-US" sz="4000" b="1" dirty="0">
-                <a:effectLst/>
-                <a:latin typeface="Calibri" panose="020F0502020204030204" pitchFamily="34" charset="0"/>
-                <a:ea typeface="Calibri" panose="020F0502020204030204" pitchFamily="34" charset="0"/>
-                <a:cs typeface="Calibri" panose="020F0502020204030204" pitchFamily="34" charset="0"/>
-              </a:rPr>
-              <a:t> </a:t>
-            </a:r>
-            <a:br>
-              <a:rPr lang="en-US" sz="1800" dirty="0">
-                <a:effectLst/>
-                <a:latin typeface="Calibri" panose="020F0502020204030204" pitchFamily="34" charset="0"/>
-                <a:ea typeface="Calibri" panose="020F0502020204030204" pitchFamily="34" charset="0"/>
-                <a:cs typeface="Times New Roman" panose="02020603050405020304" pitchFamily="18" charset="0"/>
-              </a:rPr>
-            </a:br>
-            <a:endParaRPr lang="en-US" sz="4000" dirty="0">
-              <a:solidFill>
-                <a:schemeClr val="bg1">
-                  <a:lumMod val="95000"/>
-                </a:schemeClr>
-              </a:solidFill>
-            </a:endParaRPr>
+              <a:t>Burglary of vehicle peak times rated the highest at 12am and from 4:30 -11pm </a:t>
+            </a:r>
           </a:p>
         </p:txBody>
       </p:sp>
       <p:grpSp>
         <p:nvGrpSpPr>
-          <p:cNvPr id="12" name="Group 11">
-            <a:extLst>
-              <a:ext uri="{FF2B5EF4-FFF2-40B4-BE49-F238E27FC236}">
-                <a16:creationId xmlns:a16="http://schemas.microsoft.com/office/drawing/2014/main" id="{D118BC4B-81A2-4F0D-A40D-AE412C29A746}"/>
+          <p:cNvPr id="9" name="Group 8">
+            <a:extLst>
+              <a:ext uri="{FF2B5EF4-FFF2-40B4-BE49-F238E27FC236}">
+                <a16:creationId xmlns:a16="http://schemas.microsoft.com/office/drawing/2014/main" id="{C83C03F0-13E2-46D6-A23B-D2FD64A8E65E}"/>
               </a:ext>
             </a:extLst>
           </p:cNvPr>
@@ -4955,8 +4578,8 @@
         </p:nvGrpSpPr>
         <p:grpSpPr>
           <a:xfrm>
-            <a:off x="7942232" y="3052459"/>
-            <a:ext cx="5666649" cy="3657143"/>
+            <a:off x="6285712" y="2150601"/>
+            <a:ext cx="5666649" cy="3793460"/>
             <a:chOff x="7942232" y="3052459"/>
             <a:chExt cx="5666649" cy="3657143"/>
           </a:xfrm>
@@ -4966,7 +4589,7 @@
             <p:cNvPr id="10" name="Rectangle 9">
               <a:extLst>
                 <a:ext uri="{FF2B5EF4-FFF2-40B4-BE49-F238E27FC236}">
-                  <a16:creationId xmlns:a16="http://schemas.microsoft.com/office/drawing/2014/main" id="{6D37FD05-8494-485B-AA4F-EC22E1E9A25A}"/>
+                  <a16:creationId xmlns:a16="http://schemas.microsoft.com/office/drawing/2014/main" id="{4EEBB3C9-58BE-43EA-AD50-5AE380CC32DE}"/>
                 </a:ext>
               </a:extLst>
             </p:cNvPr>
@@ -4976,7 +4599,7 @@
           <p:spPr>
             <a:xfrm>
               <a:off x="7942232" y="3287749"/>
-              <a:ext cx="5632842" cy="3186562"/>
+              <a:ext cx="5632842" cy="3421853"/>
             </a:xfrm>
             <a:prstGeom prst="rect">
               <a:avLst/>
@@ -5017,10 +4640,10 @@
         </p:sp>
         <p:pic>
           <p:nvPicPr>
-            <p:cNvPr id="8" name="Picture 7" descr="Chart, histogram&#10;&#10;Description automatically generated">
+            <p:cNvPr id="11" name="Picture 10" descr="Chart, histogram&#10;&#10;Description automatically generated">
               <a:extLst>
                 <a:ext uri="{FF2B5EF4-FFF2-40B4-BE49-F238E27FC236}">
-                  <a16:creationId xmlns:a16="http://schemas.microsoft.com/office/drawing/2014/main" id="{D4182F45-7707-437D-8F63-EEF4EE9F5690}"/>
+                  <a16:creationId xmlns:a16="http://schemas.microsoft.com/office/drawing/2014/main" id="{A0E2765D-5B2B-449A-B118-2ED7C876471E}"/>
                 </a:ext>
               </a:extLst>
             </p:cNvPr>
@@ -5030,7 +4653,7 @@
             <p:nvPr/>
           </p:nvPicPr>
           <p:blipFill>
-            <a:blip r:embed="rId5">
+            <a:blip r:embed="rId2">
               <a:extLst>
                 <a:ext uri="{28A0092B-C50C-407E-A947-70E740481C1C}">
                   <a14:useLocalDpi xmlns:a14="http://schemas.microsoft.com/office/drawing/2010/main" val="0"/>
@@ -5050,9 +4673,7 @@
               <a:avLst/>
             </a:prstGeom>
             <a:ln>
-              <a:solidFill>
-                <a:schemeClr val="bg1"/>
-              </a:solidFill>
+              <a:noFill/>
             </a:ln>
           </p:spPr>
         </p:pic>
@@ -5060,7 +4681,7 @@
     </p:spTree>
     <p:extLst>
       <p:ext uri="{BB962C8B-B14F-4D97-AF65-F5344CB8AC3E}">
-        <p14:creationId xmlns:p14="http://schemas.microsoft.com/office/powerpoint/2010/main" val="1874822996"/>
+        <p14:creationId xmlns:p14="http://schemas.microsoft.com/office/powerpoint/2010/main" val="2969100067"/>
       </p:ext>
     </p:extLst>
   </p:cSld>
@@ -5070,17 +4691,9 @@
 </p:sld>
 </file>
 
-<file path=ppt/slides/slide7.xml><?xml version="1.0" encoding="utf-8"?>
+<file path=ppt/slides/slide5.xml><?xml version="1.0" encoding="utf-8"?>
 <p:sld xmlns:a="http://schemas.openxmlformats.org/drawingml/2006/main" xmlns:r="http://schemas.openxmlformats.org/officeDocument/2006/relationships" xmlns:p="http://schemas.openxmlformats.org/presentationml/2006/main">
   <p:cSld>
-    <p:bg>
-      <p:bgPr>
-        <a:solidFill>
-          <a:schemeClr val="bg1"/>
-        </a:solidFill>
-        <a:effectLst/>
-      </p:bgPr>
-    </p:bg>
     <p:spTree>
       <p:nvGrpSpPr>
         <p:cNvPr id="1" name=""/>
@@ -5095,461 +4708,421 @@
           <a:chExt cx="0" cy="0"/>
         </a:xfrm>
       </p:grpSpPr>
-      <p:sp useBgFill="1">
-        <p:nvSpPr>
-          <p:cNvPr id="9" name="Rectangle 8">
-            <a:extLst>
-              <a:ext uri="{FF2B5EF4-FFF2-40B4-BE49-F238E27FC236}">
-                <a16:creationId xmlns:a16="http://schemas.microsoft.com/office/drawing/2014/main" id="{1E644DE9-8D09-43E2-BA69-F57482CFC93A}"/>
-              </a:ext>
-              <a:ext uri="{C183D7F6-B498-43B3-948B-1728B52AA6E4}">
-                <adec:decorative xmlns:adec="http://schemas.microsoft.com/office/drawing/2017/decorative" val="1"/>
-              </a:ext>
-            </a:extLst>
-          </p:cNvPr>
-          <p:cNvSpPr>
-            <a:spLocks noGrp="1" noRot="1" noChangeAspect="1" noMove="1" noResize="1" noEditPoints="1" noAdjustHandles="1" noChangeArrowheads="1" noChangeShapeType="1" noTextEdit="1"/>
-          </p:cNvSpPr>
-          <p:nvPr>
-            <p:extLst>
-              <p:ext uri="{386F3935-93C4-4BCD-93E2-E3B085C9AB24}">
-                <p16:designElem xmlns:p16="http://schemas.microsoft.com/office/powerpoint/2015/main" val="1"/>
-              </p:ext>
-            </p:extLst>
+      <p:sp>
+        <p:nvSpPr>
+          <p:cNvPr id="2" name="Title 1">
+            <a:extLst>
+              <a:ext uri="{FF2B5EF4-FFF2-40B4-BE49-F238E27FC236}">
+                <a16:creationId xmlns:a16="http://schemas.microsoft.com/office/drawing/2014/main" id="{7CDC5953-BBE0-4F7E-B580-D10F1BD4D7BC}"/>
+              </a:ext>
+            </a:extLst>
+          </p:cNvPr>
+          <p:cNvSpPr>
+            <a:spLocks noGrp="1"/>
+          </p:cNvSpPr>
+          <p:nvPr>
+            <p:ph type="title"/>
+          </p:nvPr>
+        </p:nvSpPr>
+        <p:spPr/>
+        <p:txBody>
+          <a:bodyPr/>
+          <a:lstStyle/>
+          <a:p>
+            <a:r>
+              <a:rPr lang="en-US" dirty="0">
+                <a:solidFill>
+                  <a:schemeClr val="bg1"/>
+                </a:solidFill>
+              </a:rPr>
+              <a:t>Theft – at what time did this crime occur?</a:t>
+            </a:r>
+          </a:p>
+        </p:txBody>
+      </p:sp>
+      <p:sp>
+        <p:nvSpPr>
+          <p:cNvPr id="3" name="Content Placeholder 2">
+            <a:extLst>
+              <a:ext uri="{FF2B5EF4-FFF2-40B4-BE49-F238E27FC236}">
+                <a16:creationId xmlns:a16="http://schemas.microsoft.com/office/drawing/2014/main" id="{F156CA29-7FBF-4730-8413-55DAA9C1438F}"/>
+              </a:ext>
+            </a:extLst>
+          </p:cNvPr>
+          <p:cNvSpPr>
+            <a:spLocks noGrp="1"/>
+          </p:cNvSpPr>
+          <p:nvPr>
+            <p:ph idx="1"/>
           </p:nvPr>
         </p:nvSpPr>
         <p:spPr>
           <a:xfrm>
-            <a:off x="0" y="0"/>
-            <a:ext cx="12188952" cy="6858000"/>
+            <a:off x="458694" y="1949450"/>
+            <a:ext cx="5279497" cy="4195763"/>
           </a:xfrm>
-          <a:prstGeom prst="rect">
-            <a:avLst/>
-          </a:prstGeom>
-          <a:ln>
-            <a:noFill/>
-          </a:ln>
         </p:spPr>
-        <p:style>
-          <a:lnRef idx="2">
-            <a:schemeClr val="accent1">
-              <a:shade val="50000"/>
-            </a:schemeClr>
-          </a:lnRef>
-          <a:fillRef idx="1">
-            <a:schemeClr val="accent1"/>
-          </a:fillRef>
-          <a:effectRef idx="0">
-            <a:schemeClr val="accent1"/>
-          </a:effectRef>
-          <a:fontRef idx="minor">
-            <a:schemeClr val="lt1"/>
-          </a:fontRef>
-        </p:style>
-        <p:txBody>
-          <a:bodyPr rtlCol="0" anchor="ctr"/>
-          <a:lstStyle/>
-          <a:p>
-            <a:pPr algn="ctr"/>
-            <a:endParaRPr lang="en-US" dirty="0">
-              <a:solidFill>
-                <a:schemeClr val="tx1">
-                  <a:lumMod val="65000"/>
-                  <a:lumOff val="35000"/>
-                </a:schemeClr>
-              </a:solidFill>
-              <a:latin typeface="AvenirNext LT Pro Medium" panose="020B0504020202020204" pitchFamily="34" charset="0"/>
-            </a:endParaRPr>
-          </a:p>
-        </p:txBody>
-      </p:sp>
-      <p:sp>
-        <p:nvSpPr>
-          <p:cNvPr id="11" name="Rectangle 10">
-            <a:extLst>
-              <a:ext uri="{FF2B5EF4-FFF2-40B4-BE49-F238E27FC236}">
-                <a16:creationId xmlns:a16="http://schemas.microsoft.com/office/drawing/2014/main" id="{6C23C919-B32E-40FF-B3D8-631316E84E3E}"/>
-              </a:ext>
-              <a:ext uri="{C183D7F6-B498-43B3-948B-1728B52AA6E4}">
-                <adec:decorative xmlns:adec="http://schemas.microsoft.com/office/drawing/2017/decorative" val="1"/>
-              </a:ext>
-            </a:extLst>
-          </p:cNvPr>
-          <p:cNvSpPr>
-            <a:spLocks noGrp="1" noRot="1" noChangeAspect="1" noMove="1" noResize="1" noEditPoints="1" noAdjustHandles="1" noChangeArrowheads="1" noChangeShapeType="1" noTextEdit="1"/>
-          </p:cNvSpPr>
-          <p:nvPr>
-            <p:extLst>
-              <p:ext uri="{386F3935-93C4-4BCD-93E2-E3B085C9AB24}">
-                <p16:designElem xmlns:p16="http://schemas.microsoft.com/office/powerpoint/2015/main" val="1"/>
-              </p:ext>
-            </p:extLst>
-          </p:nvPr>
-        </p:nvSpPr>
+        <p:txBody>
+          <a:bodyPr/>
+          <a:lstStyle/>
+          <a:p>
+            <a:r>
+              <a:rPr lang="en-US" dirty="0">
+                <a:solidFill>
+                  <a:schemeClr val="bg1"/>
+                </a:solidFill>
+              </a:rPr>
+              <a:t>Theft rated at 18,444 occurrences</a:t>
+            </a:r>
+          </a:p>
+          <a:p>
+            <a:r>
+              <a:rPr lang="en-US" dirty="0">
+                <a:solidFill>
+                  <a:schemeClr val="bg1"/>
+                </a:solidFill>
+              </a:rPr>
+              <a:t>peak time of Theft occurred    at 12PM</a:t>
+            </a:r>
+          </a:p>
+          <a:p>
+            <a:r>
+              <a:rPr lang="en-US" dirty="0">
+                <a:solidFill>
+                  <a:schemeClr val="bg1"/>
+                </a:solidFill>
+              </a:rPr>
+              <a:t>Other occurrences between the hours of 4PM – 8PM</a:t>
+            </a:r>
+          </a:p>
+        </p:txBody>
+      </p:sp>
+      <p:pic>
+        <p:nvPicPr>
+          <p:cNvPr id="4" name="Picture 3" descr="Chart, histogram&#10;&#10;Description automatically generated">
+            <a:extLst>
+              <a:ext uri="{FF2B5EF4-FFF2-40B4-BE49-F238E27FC236}">
+                <a16:creationId xmlns:a16="http://schemas.microsoft.com/office/drawing/2014/main" id="{993CE60F-AFFE-4979-A3EF-77069E3AAB82}"/>
+              </a:ext>
+            </a:extLst>
+          </p:cNvPr>
+          <p:cNvPicPr>
+            <a:picLocks noChangeAspect="1"/>
+          </p:cNvPicPr>
+          <p:nvPr/>
+        </p:nvPicPr>
+        <p:blipFill>
+          <a:blip r:embed="rId2">
+            <a:extLst>
+              <a:ext uri="{28A0092B-C50C-407E-A947-70E740481C1C}">
+                <a14:useLocalDpi xmlns:a14="http://schemas.microsoft.com/office/drawing/2010/main" val="0"/>
+              </a:ext>
+            </a:extLst>
+          </a:blip>
+          <a:stretch>
+            <a:fillRect/>
+          </a:stretch>
+        </p:blipFill>
         <p:spPr>
           <a:xfrm>
-            <a:off x="0" y="0"/>
-            <a:ext cx="12192000" cy="6858000"/>
+            <a:off x="6247592" y="2218759"/>
+            <a:ext cx="5485714" cy="3657143"/>
           </a:xfrm>
           <a:prstGeom prst="rect">
             <a:avLst/>
           </a:prstGeom>
           <a:solidFill>
-            <a:srgbClr val="000000"/>
+            <a:schemeClr val="bg1"/>
           </a:solidFill>
-          <a:ln>
-            <a:noFill/>
+          <a:ln w="88900" cap="sq">
+            <a:solidFill>
+              <a:srgbClr val="FFFFFF"/>
+            </a:solidFill>
+            <a:miter lim="800000"/>
           </a:ln>
+          <a:effectLst>
+            <a:outerShdw blurRad="55000" dist="18000" dir="5400000" algn="tl" rotWithShape="0">
+              <a:srgbClr val="000000">
+                <a:alpha val="40000"/>
+              </a:srgbClr>
+            </a:outerShdw>
+          </a:effectLst>
+          <a:scene3d>
+            <a:camera prst="orthographicFront"/>
+            <a:lightRig rig="twoPt" dir="t">
+              <a:rot lat="0" lon="0" rev="7200000"/>
+            </a:lightRig>
+          </a:scene3d>
+          <a:sp3d>
+            <a:bevelT w="25400" h="19050"/>
+            <a:contourClr>
+              <a:srgbClr val="FFFFFF"/>
+            </a:contourClr>
+          </a:sp3d>
         </p:spPr>
-        <p:style>
-          <a:lnRef idx="2">
-            <a:schemeClr val="accent1">
-              <a:shade val="50000"/>
-            </a:schemeClr>
-          </a:lnRef>
-          <a:fillRef idx="1">
-            <a:schemeClr val="accent1"/>
-          </a:fillRef>
-          <a:effectRef idx="0">
-            <a:schemeClr val="accent1"/>
-          </a:effectRef>
-          <a:fontRef idx="minor">
-            <a:schemeClr val="lt1"/>
-          </a:fontRef>
-        </p:style>
-        <p:txBody>
-          <a:bodyPr rtlCol="0" anchor="ctr"/>
-          <a:lstStyle/>
-          <a:p>
-            <a:pPr algn="ctr"/>
-            <a:endParaRPr lang="en-US" dirty="0">
-              <a:solidFill>
-                <a:schemeClr val="tx1">
-                  <a:lumMod val="65000"/>
-                  <a:lumOff val="35000"/>
-                </a:schemeClr>
-              </a:solidFill>
-              <a:latin typeface="AvenirNext LT Pro Medium" panose="020B0504020202020204" pitchFamily="34" charset="0"/>
-            </a:endParaRPr>
+      </p:pic>
+    </p:spTree>
+    <p:extLst>
+      <p:ext uri="{BB962C8B-B14F-4D97-AF65-F5344CB8AC3E}">
+        <p14:creationId xmlns:p14="http://schemas.microsoft.com/office/powerpoint/2010/main" val="1148714994"/>
+      </p:ext>
+    </p:extLst>
+  </p:cSld>
+  <p:clrMapOvr>
+    <a:masterClrMapping/>
+  </p:clrMapOvr>
+</p:sld>
+</file>
+
+<file path=ppt/slides/slide6.xml><?xml version="1.0" encoding="utf-8"?>
+<p:sld xmlns:a="http://schemas.openxmlformats.org/drawingml/2006/main" xmlns:r="http://schemas.openxmlformats.org/officeDocument/2006/relationships" xmlns:p="http://schemas.openxmlformats.org/presentationml/2006/main">
+  <p:cSld>
+    <p:spTree>
+      <p:nvGrpSpPr>
+        <p:cNvPr id="1" name=""/>
+        <p:cNvGrpSpPr/>
+        <p:nvPr/>
+      </p:nvGrpSpPr>
+      <p:grpSpPr>
+        <a:xfrm>
+          <a:off x="0" y="0"/>
+          <a:ext cx="0" cy="0"/>
+          <a:chOff x="0" y="0"/>
+          <a:chExt cx="0" cy="0"/>
+        </a:xfrm>
+      </p:grpSpPr>
+      <p:sp>
+        <p:nvSpPr>
+          <p:cNvPr id="2" name="Title 1">
+            <a:extLst>
+              <a:ext uri="{FF2B5EF4-FFF2-40B4-BE49-F238E27FC236}">
+                <a16:creationId xmlns:a16="http://schemas.microsoft.com/office/drawing/2014/main" id="{1FC81D16-CCAF-4DC4-95FC-D876E8383B8B}"/>
+              </a:ext>
+            </a:extLst>
+          </p:cNvPr>
+          <p:cNvSpPr>
+            <a:spLocks noGrp="1"/>
+          </p:cNvSpPr>
+          <p:nvPr>
+            <p:ph type="title"/>
+          </p:nvPr>
+        </p:nvSpPr>
+        <p:spPr/>
+        <p:txBody>
+          <a:bodyPr/>
+          <a:lstStyle/>
+          <a:p>
+            <a:r>
+              <a:rPr lang="en-US" dirty="0">
+                <a:solidFill>
+                  <a:schemeClr val="bg1"/>
+                </a:solidFill>
+              </a:rPr>
+              <a:t>Comparison of  3 Highest Crimes </a:t>
+            </a:r>
           </a:p>
         </p:txBody>
       </p:sp>
       <p:pic>
         <p:nvPicPr>
-          <p:cNvPr id="4" name="Picture 3" descr="Technological background">
-            <a:extLst>
-              <a:ext uri="{FF2B5EF4-FFF2-40B4-BE49-F238E27FC236}">
-                <a16:creationId xmlns:a16="http://schemas.microsoft.com/office/drawing/2014/main" id="{C8F5ED7E-4C1E-41FD-8DF0-B840671492D7}"/>
+          <p:cNvPr id="5" name="Content Placeholder 4" descr="Chart&#10;&#10;Description automatically generated">
+            <a:extLst>
+              <a:ext uri="{FF2B5EF4-FFF2-40B4-BE49-F238E27FC236}">
+                <a16:creationId xmlns:a16="http://schemas.microsoft.com/office/drawing/2014/main" id="{7412E8DF-9A8A-4170-9344-69DB353F813F}"/>
               </a:ext>
             </a:extLst>
           </p:cNvPr>
           <p:cNvPicPr>
-            <a:picLocks noChangeAspect="1"/>
+            <a:picLocks noGrp="1" noChangeAspect="1"/>
           </p:cNvPicPr>
-          <p:nvPr/>
+          <p:nvPr>
+            <p:ph idx="1"/>
+          </p:nvPr>
         </p:nvPicPr>
         <p:blipFill rotWithShape="1">
           <a:blip r:embed="rId2">
-            <a:alphaModFix amt="60000"/>
+            <a:extLst>
+              <a:ext uri="{28A0092B-C50C-407E-A947-70E740481C1C}">
+                <a14:useLocalDpi xmlns:a14="http://schemas.microsoft.com/office/drawing/2010/main" val="0"/>
+              </a:ext>
+            </a:extLst>
           </a:blip>
-          <a:srcRect t="5122" b="10626"/>
+          <a:srcRect r="6949"/>
           <a:stretch/>
         </p:blipFill>
         <p:spPr>
           <a:xfrm>
-            <a:off x="20" y="10"/>
-            <a:ext cx="12191980" cy="6856614"/>
+            <a:off x="6339148" y="1828800"/>
+            <a:ext cx="5760087" cy="4126844"/>
+          </a:xfrm>
+          <a:solidFill>
+            <a:schemeClr val="bg1"/>
+          </a:solidFill>
+        </p:spPr>
+      </p:pic>
+      <p:sp>
+        <p:nvSpPr>
+          <p:cNvPr id="8" name="TextBox 7">
+            <a:extLst>
+              <a:ext uri="{FF2B5EF4-FFF2-40B4-BE49-F238E27FC236}">
+                <a16:creationId xmlns:a16="http://schemas.microsoft.com/office/drawing/2014/main" id="{AF4F382A-BA09-4A3F-A121-3F10C6776C92}"/>
+              </a:ext>
+            </a:extLst>
+          </p:cNvPr>
+          <p:cNvSpPr txBox="1"/>
+          <p:nvPr/>
+        </p:nvSpPr>
+        <p:spPr>
+          <a:xfrm>
+            <a:off x="458693" y="1691323"/>
+            <a:ext cx="5630507" cy="5755037"/>
           </a:xfrm>
           <a:prstGeom prst="rect">
             <a:avLst/>
           </a:prstGeom>
         </p:spPr>
-      </p:pic>
-      <p:grpSp>
-        <p:nvGrpSpPr>
-          <p:cNvPr id="13" name="Group 12">
-            <a:extLst>
-              <a:ext uri="{FF2B5EF4-FFF2-40B4-BE49-F238E27FC236}">
-                <a16:creationId xmlns:a16="http://schemas.microsoft.com/office/drawing/2014/main" id="{5EDAD761-2CF4-463A-AD87-1D4E8549D7A5}"/>
-              </a:ext>
-              <a:ext uri="{C183D7F6-B498-43B3-948B-1728B52AA6E4}">
-                <adec:decorative xmlns:adec="http://schemas.microsoft.com/office/drawing/2017/decorative" val="1"/>
-              </a:ext>
-            </a:extLst>
-          </p:cNvPr>
-          <p:cNvGrpSpPr>
-            <a:grpSpLocks noGrp="1" noUngrp="1" noRot="1" noChangeAspect="1" noMove="1" noResize="1"/>
-          </p:cNvGrpSpPr>
-          <p:nvPr>
-            <p:extLst>
-              <p:ext uri="{386F3935-93C4-4BCD-93E2-E3B085C9AB24}">
-                <p16:designElem xmlns:p16="http://schemas.microsoft.com/office/powerpoint/2015/main" val="1"/>
-              </p:ext>
-            </p:extLst>
-          </p:nvPr>
-        </p:nvGrpSpPr>
-        <p:grpSpPr>
-          <a:xfrm>
-            <a:off x="4464881" y="0"/>
-            <a:ext cx="7724071" cy="6858000"/>
-            <a:chOff x="4464881" y="0"/>
-            <a:chExt cx="7724071" cy="6858000"/>
-          </a:xfrm>
-        </p:grpSpPr>
-        <p:pic>
-          <p:nvPicPr>
-            <p:cNvPr id="14" name="Picture 13">
-              <a:extLst>
-                <a:ext uri="{FF2B5EF4-FFF2-40B4-BE49-F238E27FC236}">
-                  <a16:creationId xmlns:a16="http://schemas.microsoft.com/office/drawing/2014/main" id="{D9DF7D3C-2892-4632-9E66-4D1E023A00E6}"/>
-                </a:ext>
-                <a:ext uri="{C183D7F6-B498-43B3-948B-1728B52AA6E4}">
-                  <adec:decorative xmlns:adec="http://schemas.microsoft.com/office/drawing/2017/decorative" val="1"/>
-                </a:ext>
-              </a:extLst>
-            </p:cNvPr>
-            <p:cNvPicPr>
-              <a:picLocks noChangeAspect="1"/>
-            </p:cNvPicPr>
-            <p:nvPr>
-              <p:extLst>
-                <p:ext uri="{386F3935-93C4-4BCD-93E2-E3B085C9AB24}">
-                  <p16:designElem xmlns:p16="http://schemas.microsoft.com/office/powerpoint/2015/main" val="1"/>
-                </p:ext>
-              </p:extLst>
-            </p:nvPr>
-          </p:nvPicPr>
-          <p:blipFill>
-            <a:blip r:embed="rId3">
-              <a:alphaModFix amt="25000"/>
-              <a:extLst>
-                <a:ext uri="{28A0092B-C50C-407E-A947-70E740481C1C}">
-                  <a14:useLocalDpi xmlns:a14="http://schemas.microsoft.com/office/drawing/2010/main" val="0"/>
-                </a:ext>
-              </a:extLst>
-            </a:blip>
-            <a:stretch>
-              <a:fillRect/>
-            </a:stretch>
-          </p:blipFill>
-          <p:spPr>
-            <a:xfrm>
-              <a:off x="7073255" y="0"/>
-              <a:ext cx="5115697" cy="6858000"/>
-            </a:xfrm>
-            <a:prstGeom prst="rect">
-              <a:avLst/>
-            </a:prstGeom>
-          </p:spPr>
-        </p:pic>
-        <p:pic>
-          <p:nvPicPr>
-            <p:cNvPr id="15" name="Picture 14">
-              <a:extLst>
-                <a:ext uri="{FF2B5EF4-FFF2-40B4-BE49-F238E27FC236}">
-                  <a16:creationId xmlns:a16="http://schemas.microsoft.com/office/drawing/2014/main" id="{3D2FAD08-001D-4400-AF80-51C864EF74FF}"/>
-                </a:ext>
-                <a:ext uri="{C183D7F6-B498-43B3-948B-1728B52AA6E4}">
-                  <adec:decorative xmlns:adec="http://schemas.microsoft.com/office/drawing/2017/decorative" val="1"/>
-                </a:ext>
-              </a:extLst>
-            </p:cNvPr>
-            <p:cNvPicPr>
-              <a:picLocks noChangeAspect="1"/>
-            </p:cNvPicPr>
-            <p:nvPr>
-              <p:extLst>
-                <p:ext uri="{386F3935-93C4-4BCD-93E2-E3B085C9AB24}">
-                  <p16:designElem xmlns:p16="http://schemas.microsoft.com/office/powerpoint/2015/main" val="1"/>
-                </p:ext>
-              </p:extLst>
-            </p:nvPr>
-          </p:nvPicPr>
-          <p:blipFill>
-            <a:blip r:embed="rId4">
-              <a:alphaModFix amt="15000"/>
-              <a:extLst>
-                <a:ext uri="{28A0092B-C50C-407E-A947-70E740481C1C}">
-                  <a14:useLocalDpi xmlns:a14="http://schemas.microsoft.com/office/drawing/2010/main" val="0"/>
-                </a:ext>
-              </a:extLst>
-            </a:blip>
-            <a:stretch>
-              <a:fillRect/>
-            </a:stretch>
-          </p:blipFill>
-          <p:spPr>
-            <a:xfrm rot="16200000">
-              <a:off x="5412135" y="-947254"/>
-              <a:ext cx="5562598" cy="7457106"/>
-            </a:xfrm>
-            <a:prstGeom prst="rect">
-              <a:avLst/>
-            </a:prstGeom>
-            <a:effectLst>
-              <a:softEdge rad="0"/>
-            </a:effectLst>
-          </p:spPr>
-        </p:pic>
-      </p:grpSp>
-      <p:sp>
-        <p:nvSpPr>
-          <p:cNvPr id="3" name="Subtitle 2">
-            <a:extLst>
-              <a:ext uri="{FF2B5EF4-FFF2-40B4-BE49-F238E27FC236}">
-                <a16:creationId xmlns:a16="http://schemas.microsoft.com/office/drawing/2014/main" id="{76E4A2C6-156D-41C8-BC1B-D9AB35E169AA}"/>
-              </a:ext>
-            </a:extLst>
-          </p:cNvPr>
-          <p:cNvSpPr>
-            <a:spLocks noGrp="1"/>
-          </p:cNvSpPr>
-          <p:nvPr>
-            <p:ph type="subTitle" idx="1"/>
-          </p:nvPr>
-        </p:nvSpPr>
-        <p:spPr>
-          <a:xfrm>
-            <a:off x="838200" y="4074515"/>
-            <a:ext cx="7583133" cy="1279124"/>
-          </a:xfrm>
-        </p:spPr>
-        <p:txBody>
-          <a:bodyPr>
-            <a:normAutofit lnSpcReduction="10000"/>
+        <p:txBody>
+          <a:bodyPr vert="horz" lIns="91440" tIns="45720" rIns="91440" bIns="45720" rtlCol="0">
+            <a:normAutofit/>
           </a:bodyPr>
-          <a:lstStyle/>
-          <a:p>
-            <a:pPr marL="0" marR="0">
+          <a:lstStyle>
+            <a:lvl1pPr marL="228600" indent="-228600">
               <a:lnSpc>
-                <a:spcPct val="107000"/>
+                <a:spcPct val="110000"/>
               </a:lnSpc>
               <a:spcBef>
-                <a:spcPts val="0"/>
+                <a:spcPts val="1000"/>
               </a:spcBef>
-              <a:spcAft>
-                <a:spcPts val="800"/>
-              </a:spcAft>
-            </a:pPr>
-            <a:r>
-              <a:rPr lang="en-US" sz="7200" dirty="0">
-                <a:solidFill>
-                  <a:schemeClr val="bg1">
-                    <a:lumMod val="95000"/>
-                  </a:schemeClr>
-                </a:solidFill>
-              </a:rPr>
-              <a:t>      </a:t>
-            </a:r>
-            <a:endParaRPr lang="en-US" sz="7200" dirty="0">
-              <a:solidFill>
-                <a:schemeClr val="bg2">
-                  <a:lumMod val="90000"/>
-                </a:schemeClr>
-              </a:solidFill>
-              <a:effectLst/>
-              <a:latin typeface="Calibri" panose="020F0502020204030204" pitchFamily="34" charset="0"/>
-              <a:ea typeface="Calibri" panose="020F0502020204030204" pitchFamily="34" charset="0"/>
-              <a:cs typeface="Times New Roman" panose="02020603050405020304" pitchFamily="18" charset="0"/>
-            </a:endParaRPr>
-          </a:p>
-          <a:p>
-            <a:pPr marL="342900" indent="-342900" algn="l">
+              <a:buClr>
+                <a:schemeClr val="accent1"/>
+              </a:buClr>
               <a:buFont typeface="Arial" panose="020B0604020202020204" pitchFamily="34" charset="0"/>
               <a:buChar char="•"/>
-            </a:pPr>
-            <a:endParaRPr lang="en-US" sz="3600" dirty="0">
-              <a:solidFill>
-                <a:schemeClr val="bg1">
-                  <a:lumMod val="95000"/>
-                </a:schemeClr>
-              </a:solidFill>
-            </a:endParaRPr>
-          </a:p>
-        </p:txBody>
-      </p:sp>
-      <p:sp>
-        <p:nvSpPr>
-          <p:cNvPr id="6" name="Title 5">
-            <a:extLst>
-              <a:ext uri="{FF2B5EF4-FFF2-40B4-BE49-F238E27FC236}">
-                <a16:creationId xmlns:a16="http://schemas.microsoft.com/office/drawing/2014/main" id="{FBAFD73F-0268-467A-B300-A7448F44D6D0}"/>
-              </a:ext>
-            </a:extLst>
-          </p:cNvPr>
-          <p:cNvSpPr>
-            <a:spLocks noGrp="1"/>
-          </p:cNvSpPr>
-          <p:nvPr>
-            <p:ph type="ctrTitle"/>
-          </p:nvPr>
-        </p:nvSpPr>
-        <p:spPr/>
-        <p:txBody>
-          <a:bodyPr>
-            <a:normAutofit/>
-          </a:bodyPr>
-          <a:lstStyle/>
-          <a:p>
-            <a:pPr marL="0" marR="0">
+              <a:defRPr sz="2800">
+                <a:solidFill>
+                  <a:schemeClr val="bg1"/>
+                </a:solidFill>
+              </a:defRPr>
+            </a:lvl1pPr>
+            <a:lvl2pPr marL="685800" indent="-228600">
               <a:lnSpc>
-                <a:spcPct val="107000"/>
+                <a:spcPct val="110000"/>
               </a:lnSpc>
               <a:spcBef>
-                <a:spcPts val="0"/>
+                <a:spcPts val="500"/>
               </a:spcBef>
-              <a:spcAft>
-                <a:spcPts val="800"/>
-              </a:spcAft>
-            </a:pPr>
-            <a:r>
-              <a:rPr lang="en-US" sz="4000" b="1" dirty="0">
-                <a:effectLst/>
-                <a:latin typeface="Calibri" panose="020F0502020204030204" pitchFamily="34" charset="0"/>
-                <a:ea typeface="Calibri" panose="020F0502020204030204" pitchFamily="34" charset="0"/>
-                <a:cs typeface="Calibri" panose="020F0502020204030204" pitchFamily="34" charset="0"/>
-              </a:rPr>
-              <a:t>.</a:t>
-            </a:r>
-            <a:br>
-              <a:rPr lang="en-US" sz="1800" dirty="0">
-                <a:effectLst/>
-                <a:latin typeface="Calibri" panose="020F0502020204030204" pitchFamily="34" charset="0"/>
-                <a:ea typeface="Calibri" panose="020F0502020204030204" pitchFamily="34" charset="0"/>
-                <a:cs typeface="Times New Roman" panose="02020603050405020304" pitchFamily="18" charset="0"/>
-              </a:rPr>
-            </a:br>
-            <a:r>
-              <a:rPr lang="en-US" sz="4000" b="1" dirty="0">
-                <a:effectLst/>
-                <a:latin typeface="Calibri" panose="020F0502020204030204" pitchFamily="34" charset="0"/>
-                <a:ea typeface="Calibri" panose="020F0502020204030204" pitchFamily="34" charset="0"/>
-                <a:cs typeface="Calibri" panose="020F0502020204030204" pitchFamily="34" charset="0"/>
-              </a:rPr>
-              <a:t> </a:t>
-            </a:r>
-            <a:br>
-              <a:rPr lang="en-US" sz="1800" dirty="0">
-                <a:effectLst/>
-                <a:latin typeface="Calibri" panose="020F0502020204030204" pitchFamily="34" charset="0"/>
-                <a:ea typeface="Calibri" panose="020F0502020204030204" pitchFamily="34" charset="0"/>
-                <a:cs typeface="Times New Roman" panose="02020603050405020304" pitchFamily="18" charset="0"/>
-              </a:rPr>
-            </a:br>
-            <a:endParaRPr lang="en-US" sz="4000" dirty="0">
-              <a:solidFill>
-                <a:schemeClr val="bg1">
-                  <a:lumMod val="95000"/>
-                </a:schemeClr>
-              </a:solidFill>
-            </a:endParaRPr>
+              <a:buClr>
+                <a:schemeClr val="accent1"/>
+              </a:buClr>
+              <a:buFont typeface="Arial" panose="020B0604020202020204" pitchFamily="34" charset="0"/>
+              <a:buChar char="•"/>
+              <a:defRPr sz="2400"/>
+            </a:lvl2pPr>
+            <a:lvl3pPr marL="1143000" indent="-228600">
+              <a:lnSpc>
+                <a:spcPct val="110000"/>
+              </a:lnSpc>
+              <a:spcBef>
+                <a:spcPts val="500"/>
+              </a:spcBef>
+              <a:buClr>
+                <a:schemeClr val="accent1"/>
+              </a:buClr>
+              <a:buFont typeface="Arial" panose="020B0604020202020204" pitchFamily="34" charset="0"/>
+              <a:buChar char="•"/>
+              <a:defRPr sz="2000"/>
+            </a:lvl3pPr>
+            <a:lvl4pPr marL="1600200" indent="-228600">
+              <a:lnSpc>
+                <a:spcPct val="110000"/>
+              </a:lnSpc>
+              <a:spcBef>
+                <a:spcPts val="500"/>
+              </a:spcBef>
+              <a:buClr>
+                <a:schemeClr val="accent1"/>
+              </a:buClr>
+              <a:buFont typeface="Arial" panose="020B0604020202020204" pitchFamily="34" charset="0"/>
+              <a:buChar char="•"/>
+              <a:defRPr/>
+            </a:lvl4pPr>
+            <a:lvl5pPr marL="2057400" indent="-228600">
+              <a:lnSpc>
+                <a:spcPct val="110000"/>
+              </a:lnSpc>
+              <a:spcBef>
+                <a:spcPts val="500"/>
+              </a:spcBef>
+              <a:buClr>
+                <a:schemeClr val="accent1"/>
+              </a:buClr>
+              <a:buFont typeface="Arial" panose="020B0604020202020204" pitchFamily="34" charset="0"/>
+              <a:buChar char="•"/>
+              <a:defRPr/>
+            </a:lvl5pPr>
+            <a:lvl6pPr marL="2514600" indent="-228600">
+              <a:lnSpc>
+                <a:spcPct val="90000"/>
+              </a:lnSpc>
+              <a:spcBef>
+                <a:spcPts val="500"/>
+              </a:spcBef>
+              <a:buFont typeface="Arial" panose="020B0604020202020204" pitchFamily="34" charset="0"/>
+              <a:buChar char="•"/>
+              <a:defRPr/>
+            </a:lvl6pPr>
+            <a:lvl7pPr marL="2971800" indent="-228600">
+              <a:lnSpc>
+                <a:spcPct val="90000"/>
+              </a:lnSpc>
+              <a:spcBef>
+                <a:spcPts val="500"/>
+              </a:spcBef>
+              <a:buFont typeface="Arial" panose="020B0604020202020204" pitchFamily="34" charset="0"/>
+              <a:buChar char="•"/>
+              <a:defRPr/>
+            </a:lvl7pPr>
+            <a:lvl8pPr marL="3429000" indent="-228600">
+              <a:lnSpc>
+                <a:spcPct val="90000"/>
+              </a:lnSpc>
+              <a:spcBef>
+                <a:spcPts val="500"/>
+              </a:spcBef>
+              <a:buFont typeface="Arial" panose="020B0604020202020204" pitchFamily="34" charset="0"/>
+              <a:buChar char="•"/>
+              <a:defRPr/>
+            </a:lvl8pPr>
+            <a:lvl9pPr marL="3886200" indent="-228600">
+              <a:lnSpc>
+                <a:spcPct val="90000"/>
+              </a:lnSpc>
+              <a:spcBef>
+                <a:spcPts val="500"/>
+              </a:spcBef>
+              <a:buFont typeface="Arial" panose="020B0604020202020204" pitchFamily="34" charset="0"/>
+              <a:buChar char="•"/>
+              <a:defRPr/>
+            </a:lvl9pPr>
+          </a:lstStyle>
+          <a:p>
+            <a:r>
+              <a:rPr lang="en-US" dirty="0"/>
+              <a:t>Conclusion for the analysis of three highest crimes, was that the lowest occurrences happened during the hours of 4Am-8AM.  </a:t>
+            </a:r>
+          </a:p>
+          <a:p>
+            <a:r>
+              <a:rPr lang="en-US" dirty="0"/>
+              <a:t>I had originally thought that aggravated assault would have the highest rated occurrences.</a:t>
+            </a:r>
           </a:p>
         </p:txBody>
       </p:sp>
     </p:spTree>
     <p:extLst>
       <p:ext uri="{BB962C8B-B14F-4D97-AF65-F5344CB8AC3E}">
-        <p14:creationId xmlns:p14="http://schemas.microsoft.com/office/powerpoint/2010/main" val="3443546882"/>
+        <p14:creationId xmlns:p14="http://schemas.microsoft.com/office/powerpoint/2010/main" val="3245977186"/>
       </p:ext>
     </p:extLst>
   </p:cSld>

</xml_diff>